<commit_message>
v12 revise intro game video
</commit_message>
<xml_diff>
--- a/Slides/intro_game.pptx
+++ b/Slides/intro_game.pptx
@@ -210,7 +210,7 @@
           <a:p>
             <a:fld id="{21FB3B98-C8FE-C64B-981D-75D6577A64C4}" type="datetimeFigureOut">
               <a:rPr lang="en-US" smtClean="0"/>
-              <a:t>6/22/24</a:t>
+              <a:t>11/20/24</a:t>
             </a:fld>
             <a:endParaRPr lang="en-US"/>
           </a:p>
@@ -1058,7 +1058,7 @@
                 <a:ea typeface="Calibri" panose="020F0502020204030204" pitchFamily="34" charset="0"/>
                 <a:cs typeface="Times New Roman" panose="02020603050405020304" pitchFamily="18" charset="0"/>
               </a:rPr>
-              <a:t>Wiggle will either hug another Wuggle or jump up and down.</a:t>
+              <a:t>Wiggle will either hug another Wuggle or laugh.</a:t>
             </a:r>
             <a:endParaRPr lang="en-US" sz="1800" kern="100" dirty="0">
               <a:effectLst/>
@@ -1261,7 +1261,7 @@
           <a:p>
             <a:fld id="{74E2FDB6-8FF9-554C-AA18-16E1AACFE72A}" type="datetimeFigureOut">
               <a:rPr lang="en-US" smtClean="0"/>
-              <a:t>6/22/24</a:t>
+              <a:t>11/20/24</a:t>
             </a:fld>
             <a:endParaRPr lang="en-US"/>
           </a:p>
@@ -1459,7 +1459,7 @@
           <a:p>
             <a:fld id="{74E2FDB6-8FF9-554C-AA18-16E1AACFE72A}" type="datetimeFigureOut">
               <a:rPr lang="en-US" smtClean="0"/>
-              <a:t>6/22/24</a:t>
+              <a:t>11/20/24</a:t>
             </a:fld>
             <a:endParaRPr lang="en-US"/>
           </a:p>
@@ -1667,7 +1667,7 @@
           <a:p>
             <a:fld id="{74E2FDB6-8FF9-554C-AA18-16E1AACFE72A}" type="datetimeFigureOut">
               <a:rPr lang="en-US" smtClean="0"/>
-              <a:t>6/22/24</a:t>
+              <a:t>11/20/24</a:t>
             </a:fld>
             <a:endParaRPr lang="en-US"/>
           </a:p>
@@ -1865,7 +1865,7 @@
           <a:p>
             <a:fld id="{74E2FDB6-8FF9-554C-AA18-16E1AACFE72A}" type="datetimeFigureOut">
               <a:rPr lang="en-US" smtClean="0"/>
-              <a:t>6/22/24</a:t>
+              <a:t>11/20/24</a:t>
             </a:fld>
             <a:endParaRPr lang="en-US"/>
           </a:p>
@@ -2140,7 +2140,7 @@
           <a:p>
             <a:fld id="{74E2FDB6-8FF9-554C-AA18-16E1AACFE72A}" type="datetimeFigureOut">
               <a:rPr lang="en-US" smtClean="0"/>
-              <a:t>6/22/24</a:t>
+              <a:t>11/20/24</a:t>
             </a:fld>
             <a:endParaRPr lang="en-US"/>
           </a:p>
@@ -2405,7 +2405,7 @@
           <a:p>
             <a:fld id="{74E2FDB6-8FF9-554C-AA18-16E1AACFE72A}" type="datetimeFigureOut">
               <a:rPr lang="en-US" smtClean="0"/>
-              <a:t>6/22/24</a:t>
+              <a:t>11/20/24</a:t>
             </a:fld>
             <a:endParaRPr lang="en-US"/>
           </a:p>
@@ -2817,7 +2817,7 @@
           <a:p>
             <a:fld id="{74E2FDB6-8FF9-554C-AA18-16E1AACFE72A}" type="datetimeFigureOut">
               <a:rPr lang="en-US" smtClean="0"/>
-              <a:t>6/22/24</a:t>
+              <a:t>11/20/24</a:t>
             </a:fld>
             <a:endParaRPr lang="en-US"/>
           </a:p>
@@ -2958,7 +2958,7 @@
           <a:p>
             <a:fld id="{74E2FDB6-8FF9-554C-AA18-16E1AACFE72A}" type="datetimeFigureOut">
               <a:rPr lang="en-US" smtClean="0"/>
-              <a:t>6/22/24</a:t>
+              <a:t>11/20/24</a:t>
             </a:fld>
             <a:endParaRPr lang="en-US"/>
           </a:p>
@@ -3071,7 +3071,7 @@
           <a:p>
             <a:fld id="{74E2FDB6-8FF9-554C-AA18-16E1AACFE72A}" type="datetimeFigureOut">
               <a:rPr lang="en-US" smtClean="0"/>
-              <a:t>6/22/24</a:t>
+              <a:t>11/20/24</a:t>
             </a:fld>
             <a:endParaRPr lang="en-US"/>
           </a:p>
@@ -3382,7 +3382,7 @@
           <a:p>
             <a:fld id="{74E2FDB6-8FF9-554C-AA18-16E1AACFE72A}" type="datetimeFigureOut">
               <a:rPr lang="en-US" smtClean="0"/>
-              <a:t>6/22/24</a:t>
+              <a:t>11/20/24</a:t>
             </a:fld>
             <a:endParaRPr lang="en-US"/>
           </a:p>
@@ -3670,7 +3670,7 @@
           <a:p>
             <a:fld id="{74E2FDB6-8FF9-554C-AA18-16E1AACFE72A}" type="datetimeFigureOut">
               <a:rPr lang="en-US" smtClean="0"/>
-              <a:t>6/22/24</a:t>
+              <a:t>11/20/24</a:t>
             </a:fld>
             <a:endParaRPr lang="en-US"/>
           </a:p>
@@ -3911,7 +3911,7 @@
           <a:p>
             <a:fld id="{74E2FDB6-8FF9-554C-AA18-16E1AACFE72A}" type="datetimeFigureOut">
               <a:rPr lang="en-US" smtClean="0"/>
-              <a:t>6/22/24</a:t>
+              <a:t>11/20/24</a:t>
             </a:fld>
             <a:endParaRPr lang="en-US"/>
           </a:p>
@@ -4365,10 +4365,10 @@
       </p:pic>
       <p:pic>
         <p:nvPicPr>
-          <p:cNvPr id="14" name="Audio 13">
-            <a:extLst>
-              <a:ext uri="{FF2B5EF4-FFF2-40B4-BE49-F238E27FC236}">
-                <a16:creationId xmlns:a16="http://schemas.microsoft.com/office/drawing/2014/main" id="{E8E4AB59-E23D-104B-CF76-737C9EE0E9CF}"/>
+          <p:cNvPr id="13" name="Audio 12">
+            <a:extLst>
+              <a:ext uri="{FF2B5EF4-FFF2-40B4-BE49-F238E27FC236}">
+                <a16:creationId xmlns:a16="http://schemas.microsoft.com/office/drawing/2014/main" id="{83141AA6-A633-5C73-650C-29397F60188D}"/>
               </a:ext>
             </a:extLst>
           </p:cNvPr>
@@ -4412,10 +4412,10 @@
   </p:clrMapOvr>
   <mc:AlternateContent xmlns:mc="http://schemas.openxmlformats.org/markup-compatibility/2006">
     <mc:Choice xmlns:p14="http://schemas.microsoft.com/office/powerpoint/2010/main" Requires="p14">
-      <p:transition spd="slow" p14:dur="2000" advTm="13429"/>
+      <p:transition spd="slow" p14:dur="2000" advTm="12256"/>
     </mc:Choice>
     <mc:Fallback>
-      <p:transition spd="slow" advTm="13429"/>
+      <p:transition spd="slow" advTm="12256"/>
     </mc:Fallback>
   </mc:AlternateContent>
   <p:timing>
@@ -4451,7 +4451,7 @@
                                       <p:cBhvr>
                                         <p:cTn id="6" dur="1" fill="hold"/>
                                         <p:tgtEl>
-                                          <p:spTgt spid="14"/>
+                                          <p:spTgt spid="13"/>
                                         </p:tgtEl>
                                       </p:cBhvr>
                                     </p:cmd>
@@ -4496,7 +4496,7 @@
                   </p:endCondLst>
                 </p:cTn>
                 <p:tgtEl>
-                  <p:spTgt spid="14"/>
+                  <p:spTgt spid="13"/>
                 </p:tgtEl>
               </p:cMediaNode>
             </p:audio>
@@ -4647,10 +4647,10 @@
       </p:pic>
       <p:pic>
         <p:nvPicPr>
-          <p:cNvPr id="12" name="Audio 11">
-            <a:extLst>
-              <a:ext uri="{FF2B5EF4-FFF2-40B4-BE49-F238E27FC236}">
-                <a16:creationId xmlns:a16="http://schemas.microsoft.com/office/drawing/2014/main" id="{FC7896F9-5939-23F0-988E-AAE22A5EEDB9}"/>
+          <p:cNvPr id="8" name="Audio 7">
+            <a:extLst>
+              <a:ext uri="{FF2B5EF4-FFF2-40B4-BE49-F238E27FC236}">
+                <a16:creationId xmlns:a16="http://schemas.microsoft.com/office/drawing/2014/main" id="{D26F9F45-263F-E1D4-78FC-C3041315C6E5}"/>
               </a:ext>
             </a:extLst>
           </p:cNvPr>
@@ -4694,10 +4694,10 @@
   </p:clrMapOvr>
   <mc:AlternateContent xmlns:mc="http://schemas.openxmlformats.org/markup-compatibility/2006">
     <mc:Choice xmlns:p14="http://schemas.microsoft.com/office/powerpoint/2010/main" Requires="p14">
-      <p:transition spd="slow" p14:dur="2000" advTm="5557"/>
+      <p:transition spd="slow" p14:dur="2000" advTm="6432"/>
     </mc:Choice>
     <mc:Fallback>
-      <p:transition spd="slow" advTm="5557"/>
+      <p:transition spd="slow" advTm="6432"/>
     </mc:Fallback>
   </mc:AlternateContent>
   <p:timing>
@@ -4733,7 +4733,7 @@
                                       <p:cBhvr>
                                         <p:cTn id="6" dur="1" fill="hold"/>
                                         <p:tgtEl>
-                                          <p:spTgt spid="12"/>
+                                          <p:spTgt spid="8"/>
                                         </p:tgtEl>
                                       </p:cBhvr>
                                     </p:cmd>
@@ -4778,7 +4778,7 @@
                   </p:endCondLst>
                 </p:cTn>
                 <p:tgtEl>
-                  <p:spTgt spid="12"/>
+                  <p:spTgt spid="8"/>
                 </p:tgtEl>
               </p:cMediaNode>
             </p:audio>
@@ -4829,7 +4829,7 @@
         </p:nvPicPr>
         <p:blipFill>
           <a:blip r:embed="rId6"/>
-          <a:srcRect l="604" r="604"/>
+          <a:srcRect/>
           <a:stretch/>
         </p:blipFill>
         <p:spPr>
@@ -4882,7 +4882,7 @@
         </p:nvPicPr>
         <p:blipFill>
           <a:blip r:embed="rId7"/>
-          <a:srcRect l="604" r="604"/>
+          <a:srcRect/>
           <a:stretch/>
         </p:blipFill>
         <p:spPr>
@@ -4999,10 +4999,10 @@
       </p:sp>
       <p:pic>
         <p:nvPicPr>
-          <p:cNvPr id="9" name="Audio 8">
-            <a:extLst>
-              <a:ext uri="{FF2B5EF4-FFF2-40B4-BE49-F238E27FC236}">
-                <a16:creationId xmlns:a16="http://schemas.microsoft.com/office/drawing/2014/main" id="{A5F30A62-8335-A262-7F73-A978C0BE8A9C}"/>
+          <p:cNvPr id="5" name="Audio 4">
+            <a:extLst>
+              <a:ext uri="{FF2B5EF4-FFF2-40B4-BE49-F238E27FC236}">
+                <a16:creationId xmlns:a16="http://schemas.microsoft.com/office/drawing/2014/main" id="{50681F67-319F-3911-0385-CD446AD30A08}"/>
               </a:ext>
             </a:extLst>
           </p:cNvPr>
@@ -5049,10 +5049,10 @@
   </p:clrMapOvr>
   <mc:AlternateContent xmlns:mc="http://schemas.openxmlformats.org/markup-compatibility/2006">
     <mc:Choice xmlns:p14="http://schemas.microsoft.com/office/powerpoint/2010/main" Requires="p14">
-      <p:transition spd="slow" p14:dur="2000" advTm="15200"/>
+      <p:transition spd="slow" p14:dur="2000" advTm="14506"/>
     </mc:Choice>
     <mc:Fallback>
-      <p:transition spd="slow" advTm="15200"/>
+      <p:transition spd="slow" advTm="14506"/>
     </mc:Fallback>
   </mc:AlternateContent>
   <p:timing>
@@ -5088,7 +5088,7 @@
                                       <p:cBhvr>
                                         <p:cTn id="6" dur="1" fill="hold"/>
                                         <p:tgtEl>
-                                          <p:spTgt spid="9"/>
+                                          <p:spTgt spid="5"/>
                                         </p:tgtEl>
                                       </p:cBhvr>
                                     </p:cmd>
@@ -5275,7 +5275,7 @@
                   </p:endCondLst>
                 </p:cTn>
                 <p:tgtEl>
-                  <p:spTgt spid="9"/>
+                  <p:spTgt spid="5"/>
                 </p:tgtEl>
               </p:cMediaNode>
             </p:audio>
@@ -5289,7 +5289,7 @@
 
 <file path=ppt/tags/tag1.xml><?xml version="1.0" encoding="utf-8"?>
 <p:tagLst xmlns:a="http://schemas.openxmlformats.org/drawingml/2006/main" xmlns:r="http://schemas.openxmlformats.org/officeDocument/2006/relationships" xmlns:p="http://schemas.openxmlformats.org/presentationml/2006/main">
-  <p:tag name="TIMING" val="|6.6|3.5"/>
+  <p:tag name="TIMING" val="|7.5|3"/>
 </p:tagLst>
 </file>
 

</xml_diff>